<commit_message>
Updated growth handout and quiz
</commit_message>
<xml_diff>
--- a/PHYS101/adrenals-and-stress-hormones/Lectures 2 and 3 Quiz.pptx
+++ b/PHYS101/adrenals-and-stress-hormones/Lectures 2 and 3 Quiz.pptx
@@ -293,7 +293,7 @@
           <a:p>
             <a:fld id="{95A1730F-51BC-B945-879D-A0F86FB94171}" type="datetimeFigureOut">
               <a:rPr lang="en-US" smtClean="0"/>
-              <a:t>3/25/15</a:t>
+              <a:t>3/24/16</a:t>
             </a:fld>
             <a:endParaRPr lang="en-US"/>
           </a:p>
@@ -463,7 +463,7 @@
           <a:p>
             <a:fld id="{95A1730F-51BC-B945-879D-A0F86FB94171}" type="datetimeFigureOut">
               <a:rPr lang="en-US" smtClean="0"/>
-              <a:t>3/25/15</a:t>
+              <a:t>3/24/16</a:t>
             </a:fld>
             <a:endParaRPr lang="en-US"/>
           </a:p>
@@ -643,7 +643,7 @@
           <a:p>
             <a:fld id="{95A1730F-51BC-B945-879D-A0F86FB94171}" type="datetimeFigureOut">
               <a:rPr lang="en-US" smtClean="0"/>
-              <a:t>3/25/15</a:t>
+              <a:t>3/24/16</a:t>
             </a:fld>
             <a:endParaRPr lang="en-US"/>
           </a:p>
@@ -813,7 +813,7 @@
           <a:p>
             <a:fld id="{95A1730F-51BC-B945-879D-A0F86FB94171}" type="datetimeFigureOut">
               <a:rPr lang="en-US" smtClean="0"/>
-              <a:t>3/25/15</a:t>
+              <a:t>3/24/16</a:t>
             </a:fld>
             <a:endParaRPr lang="en-US"/>
           </a:p>
@@ -1059,7 +1059,7 @@
           <a:p>
             <a:fld id="{95A1730F-51BC-B945-879D-A0F86FB94171}" type="datetimeFigureOut">
               <a:rPr lang="en-US" smtClean="0"/>
-              <a:t>3/25/15</a:t>
+              <a:t>3/24/16</a:t>
             </a:fld>
             <a:endParaRPr lang="en-US"/>
           </a:p>
@@ -1347,7 +1347,7 @@
           <a:p>
             <a:fld id="{95A1730F-51BC-B945-879D-A0F86FB94171}" type="datetimeFigureOut">
               <a:rPr lang="en-US" smtClean="0"/>
-              <a:t>3/25/15</a:t>
+              <a:t>3/24/16</a:t>
             </a:fld>
             <a:endParaRPr lang="en-US"/>
           </a:p>
@@ -1769,7 +1769,7 @@
           <a:p>
             <a:fld id="{95A1730F-51BC-B945-879D-A0F86FB94171}" type="datetimeFigureOut">
               <a:rPr lang="en-US" smtClean="0"/>
-              <a:t>3/25/15</a:t>
+              <a:t>3/24/16</a:t>
             </a:fld>
             <a:endParaRPr lang="en-US"/>
           </a:p>
@@ -1887,7 +1887,7 @@
           <a:p>
             <a:fld id="{95A1730F-51BC-B945-879D-A0F86FB94171}" type="datetimeFigureOut">
               <a:rPr lang="en-US" smtClean="0"/>
-              <a:t>3/25/15</a:t>
+              <a:t>3/24/16</a:t>
             </a:fld>
             <a:endParaRPr lang="en-US"/>
           </a:p>
@@ -1982,7 +1982,7 @@
           <a:p>
             <a:fld id="{95A1730F-51BC-B945-879D-A0F86FB94171}" type="datetimeFigureOut">
               <a:rPr lang="en-US" smtClean="0"/>
-              <a:t>3/25/15</a:t>
+              <a:t>3/24/16</a:t>
             </a:fld>
             <a:endParaRPr lang="en-US"/>
           </a:p>
@@ -2259,7 +2259,7 @@
           <a:p>
             <a:fld id="{95A1730F-51BC-B945-879D-A0F86FB94171}" type="datetimeFigureOut">
               <a:rPr lang="en-US" smtClean="0"/>
-              <a:t>3/25/15</a:t>
+              <a:t>3/24/16</a:t>
             </a:fld>
             <a:endParaRPr lang="en-US"/>
           </a:p>
@@ -2512,7 +2512,7 @@
           <a:p>
             <a:fld id="{95A1730F-51BC-B945-879D-A0F86FB94171}" type="datetimeFigureOut">
               <a:rPr lang="en-US" smtClean="0"/>
-              <a:t>3/25/15</a:t>
+              <a:t>3/24/16</a:t>
             </a:fld>
             <a:endParaRPr lang="en-US"/>
           </a:p>
@@ -2725,7 +2725,7 @@
           <a:p>
             <a:fld id="{95A1730F-51BC-B945-879D-A0F86FB94171}" type="datetimeFigureOut">
               <a:rPr lang="en-US" smtClean="0"/>
-              <a:t>3/25/15</a:t>
+              <a:t>3/24/16</a:t>
             </a:fld>
             <a:endParaRPr lang="en-US"/>
           </a:p>
@@ -3384,21 +3384,42 @@
                 <a:latin typeface="Calibri" charset="0"/>
                 <a:ea typeface="MS PGothic" charset="0"/>
               </a:rPr>
-              <a:t>, treated with a beta blocker.  We expect that this drug should </a:t>
-            </a:r>
-            <a:r>
-              <a:rPr lang="en-US" sz="3200" b="1" i="1" dirty="0" smtClean="0">
-                <a:latin typeface="Calibri" charset="0"/>
-                <a:ea typeface="MS PGothic" charset="0"/>
-              </a:rPr>
-              <a:t>alleviate</a:t>
+              <a:t>, </a:t>
             </a:r>
             <a:r>
               <a:rPr lang="en-US" sz="3200" dirty="0" smtClean="0">
                 <a:latin typeface="Calibri" charset="0"/>
                 <a:ea typeface="MS PGothic" charset="0"/>
               </a:rPr>
-              <a:t> the patient’s:</a:t>
+              <a:t>we </a:t>
+            </a:r>
+            <a:r>
+              <a:rPr lang="en-US" sz="3200" dirty="0" smtClean="0">
+                <a:latin typeface="Calibri" charset="0"/>
+                <a:ea typeface="MS PGothic" charset="0"/>
+              </a:rPr>
+              <a:t>expect that this </a:t>
+            </a:r>
+            <a:r>
+              <a:rPr lang="en-US" sz="3200" dirty="0" smtClean="0">
+                <a:latin typeface="Calibri" charset="0"/>
+                <a:ea typeface="MS PGothic" charset="0"/>
+              </a:rPr>
+              <a:t>the patien</a:t>
+            </a:r>
+            <a:r>
+              <a:rPr lang="en-US" sz="3200" dirty="0" smtClean="0">
+                <a:latin typeface="Calibri" charset="0"/>
+                <a:ea typeface="MS PGothic" charset="0"/>
+              </a:rPr>
+              <a:t>t should have</a:t>
+            </a:r>
+            <a:r>
+              <a:rPr lang="en-US" sz="3200" dirty="0" smtClean="0">
+                <a:latin typeface="Calibri" charset="0"/>
+                <a:ea typeface="MS PGothic" charset="0"/>
+              </a:rPr>
+              <a:t>:</a:t>
             </a:r>
             <a:endParaRPr lang="en-US" sz="3200" dirty="0">
               <a:latin typeface="Calibri" charset="0"/>
@@ -3459,8 +3480,12 @@
                 <a:latin typeface="Calibri" charset="0"/>
                 <a:ea typeface="MS PGothic" charset="0"/>
               </a:rPr>
-              <a:t>GI tract smooth muscle cell vasodilation</a:t>
-            </a:r>
+              <a:t>Reduced gluconeogenesis</a:t>
+            </a:r>
+            <a:endParaRPr lang="en-US" dirty="0" smtClean="0">
+              <a:latin typeface="Calibri" charset="0"/>
+              <a:ea typeface="MS PGothic" charset="0"/>
+            </a:endParaRPr>
           </a:p>
           <a:p>
             <a:pPr marL="514350" indent="-514350" eaLnBrk="1" hangingPunct="1">
@@ -3481,16 +3506,19 @@
               <a:buAutoNum type="alphaUcPeriod"/>
             </a:pPr>
             <a:r>
+              <a:rPr lang="en-US" smtClean="0">
+                <a:latin typeface="Calibri" charset="0"/>
+                <a:ea typeface="MS PGothic" charset="0"/>
+              </a:rPr>
+              <a:t>Increased salt </a:t>
+            </a:r>
+            <a:r>
               <a:rPr lang="en-US" dirty="0" smtClean="0">
                 <a:latin typeface="Calibri" charset="0"/>
                 <a:ea typeface="MS PGothic" charset="0"/>
               </a:rPr>
-              <a:t>All of the above</a:t>
-            </a:r>
-            <a:endParaRPr lang="en-US" dirty="0">
-              <a:latin typeface="Calibri" charset="0"/>
-              <a:ea typeface="MS PGothic" charset="0"/>
-            </a:endParaRPr>
+              <a:t>retention</a:t>
+            </a:r>
           </a:p>
         </p:txBody>
       </p:sp>

</xml_diff>